<commit_message>
Puesta en produccion en AWS
</commit_message>
<xml_diff>
--- a/EXPLICACION.pptx
+++ b/EXPLICACION.pptx
@@ -14581,14 +14581,14 @@
                 <a:latin typeface="Courier New" panose="02070309020205020404" pitchFamily="49" charset="0"/>
                 <a:cs typeface="Courier New" panose="02070309020205020404" pitchFamily="49" charset="0"/>
               </a:rPr>
-              <a:t> --</a:t>
+              <a:t> –-</a:t>
             </a:r>
             <a:r>
               <a:rPr lang="es-ES" dirty="0" err="1">
                 <a:latin typeface="Courier New" panose="02070309020205020404" pitchFamily="49" charset="0"/>
                 <a:cs typeface="Courier New" panose="02070309020205020404" pitchFamily="49" charset="0"/>
               </a:rPr>
-              <a:t>prod</a:t>
+              <a:t>configuration</a:t>
             </a:r>
             <a:r>
               <a:rPr lang="es-ES" dirty="0">
@@ -14596,6 +14596,13 @@
                 <a:cs typeface="Courier New" panose="02070309020205020404" pitchFamily="49" charset="0"/>
               </a:rPr>
               <a:t> </a:t>
+            </a:r>
+            <a:r>
+              <a:rPr lang="es-ES" dirty="0" err="1">
+                <a:latin typeface="Courier New" panose="02070309020205020404" pitchFamily="49" charset="0"/>
+                <a:cs typeface="Courier New" panose="02070309020205020404" pitchFamily="49" charset="0"/>
+              </a:rPr>
+              <a:t>production</a:t>
             </a:r>
             <a:br>
               <a:rPr lang="es-ES" dirty="0"/>
@@ -14647,20 +14654,46 @@
               <a:t>Al ejecutar </a:t>
             </a:r>
             <a:r>
-              <a:rPr lang="es-ES" b="1" dirty="0"/>
+              <a:rPr lang="es-ES" dirty="0">
+                <a:latin typeface="Courier New" panose="02070309020205020404" pitchFamily="49" charset="0"/>
+                <a:cs typeface="Courier New" panose="02070309020205020404" pitchFamily="49" charset="0"/>
+              </a:rPr>
               <a:t>ng </a:t>
             </a:r>
             <a:r>
-              <a:rPr lang="es-ES" b="1" dirty="0" err="1"/>
+              <a:rPr lang="es-ES" dirty="0" err="1">
+                <a:latin typeface="Courier New" panose="02070309020205020404" pitchFamily="49" charset="0"/>
+                <a:cs typeface="Courier New" panose="02070309020205020404" pitchFamily="49" charset="0"/>
+              </a:rPr>
               <a:t>build</a:t>
             </a:r>
             <a:r>
-              <a:rPr lang="es-ES" b="1" dirty="0"/>
-              <a:t> --</a:t>
-            </a:r>
-            <a:r>
-              <a:rPr lang="es-ES" b="1" dirty="0" err="1"/>
-              <a:t>prod</a:t>
+              <a:rPr lang="es-ES" dirty="0">
+                <a:latin typeface="Courier New" panose="02070309020205020404" pitchFamily="49" charset="0"/>
+                <a:cs typeface="Courier New" panose="02070309020205020404" pitchFamily="49" charset="0"/>
+              </a:rPr>
+              <a:t> –-</a:t>
+            </a:r>
+            <a:r>
+              <a:rPr lang="es-ES" dirty="0" err="1">
+                <a:latin typeface="Courier New" panose="02070309020205020404" pitchFamily="49" charset="0"/>
+                <a:cs typeface="Courier New" panose="02070309020205020404" pitchFamily="49" charset="0"/>
+              </a:rPr>
+              <a:t>configuration</a:t>
+            </a:r>
+            <a:r>
+              <a:rPr lang="es-ES" dirty="0">
+                <a:latin typeface="Courier New" panose="02070309020205020404" pitchFamily="49" charset="0"/>
+                <a:cs typeface="Courier New" panose="02070309020205020404" pitchFamily="49" charset="0"/>
+              </a:rPr>
+              <a:t> </a:t>
+            </a:r>
+            <a:r>
+              <a:rPr lang="es-ES" dirty="0" err="1">
+                <a:latin typeface="Courier New" panose="02070309020205020404" pitchFamily="49" charset="0"/>
+                <a:cs typeface="Courier New" panose="02070309020205020404" pitchFamily="49" charset="0"/>
+              </a:rPr>
+              <a:t>production</a:t>
             </a:r>
             <a:r>
               <a:rPr lang="es-ES" dirty="0"/>

</xml_diff>